<commit_message>
updating with the ability to follow along
</commit_message>
<xml_diff>
--- a/Becoming a jQuery Expert.pptx
+++ b/Becoming a jQuery Expert.pptx
@@ -5,7 +5,7 @@
     <p:sldMasterId id="2147483654" r:id="rId1"/>
   </p:sldMasterIdLst>
   <p:notesMasterIdLst>
-    <p:notesMasterId r:id="rId53"/>
+    <p:notesMasterId r:id="rId52"/>
   </p:notesMasterIdLst>
   <p:sldIdLst>
     <p:sldId id="256" r:id="rId2"/>
@@ -47,18 +47,17 @@
     <p:sldId id="331" r:id="rId38"/>
     <p:sldId id="344" r:id="rId39"/>
     <p:sldId id="332" r:id="rId40"/>
-    <p:sldId id="345" r:id="rId41"/>
-    <p:sldId id="333" r:id="rId42"/>
-    <p:sldId id="334" r:id="rId43"/>
-    <p:sldId id="337" r:id="rId44"/>
-    <p:sldId id="338" r:id="rId45"/>
-    <p:sldId id="336" r:id="rId46"/>
-    <p:sldId id="264" r:id="rId47"/>
-    <p:sldId id="339" r:id="rId48"/>
-    <p:sldId id="340" r:id="rId49"/>
-    <p:sldId id="346" r:id="rId50"/>
-    <p:sldId id="347" r:id="rId51"/>
-    <p:sldId id="343" r:id="rId52"/>
+    <p:sldId id="333" r:id="rId41"/>
+    <p:sldId id="334" r:id="rId42"/>
+    <p:sldId id="337" r:id="rId43"/>
+    <p:sldId id="338" r:id="rId44"/>
+    <p:sldId id="336" r:id="rId45"/>
+    <p:sldId id="264" r:id="rId46"/>
+    <p:sldId id="339" r:id="rId47"/>
+    <p:sldId id="340" r:id="rId48"/>
+    <p:sldId id="346" r:id="rId49"/>
+    <p:sldId id="347" r:id="rId50"/>
+    <p:sldId id="343" r:id="rId51"/>
   </p:sldIdLst>
   <p:sldSz cx="9144000" cy="5143500" type="screen16x9"/>
   <p:notesSz cx="6858000" cy="9144000"/>
@@ -4038,7 +4037,47 @@
                 <a:latin typeface="Courier New"/>
                 <a:cs typeface="Courier New"/>
               </a:rPr>
-              <a:t>[&lt;body&gt;​…​&lt;/body&gt;]</a:t>
+              <a:t>[</a:t>
+            </a:r>
+            <a:r>
+              <a:rPr lang="en-US" sz="1400" b="1" dirty="0" smtClean="0">
+                <a:solidFill>
+                  <a:schemeClr val="tx2"/>
+                </a:solidFill>
+                <a:latin typeface="Courier New"/>
+                <a:cs typeface="Courier New"/>
+              </a:rPr>
+              <a:t>&lt;div id="markup"&gt;</a:t>
+            </a:r>
+            <a:r>
+              <a:rPr lang="en-US" sz="1400" b="1" dirty="0">
+                <a:solidFill>
+                  <a:schemeClr val="tx2"/>
+                </a:solidFill>
+                <a:latin typeface="Courier New"/>
+                <a:cs typeface="Courier New"/>
+              </a:rPr>
+              <a:t>​…​&lt;</a:t>
+            </a:r>
+            <a:r>
+              <a:rPr lang="en-US" sz="1400" b="1" dirty="0" smtClean="0">
+                <a:solidFill>
+                  <a:schemeClr val="tx2"/>
+                </a:solidFill>
+                <a:latin typeface="Courier New"/>
+                <a:cs typeface="Courier New"/>
+              </a:rPr>
+              <a:t>/div&gt;</a:t>
+            </a:r>
+            <a:r>
+              <a:rPr lang="en-US" sz="1400" b="1" dirty="0">
+                <a:solidFill>
+                  <a:schemeClr val="tx2"/>
+                </a:solidFill>
+                <a:latin typeface="Courier New"/>
+                <a:cs typeface="Courier New"/>
+              </a:rPr>
+              <a:t>]</a:t>
             </a:r>
           </a:p>
           <a:p>
@@ -13038,53 +13077,66 @@
           <a:p>
             <a:r>
               <a:rPr lang="en-US" dirty="0" smtClean="0"/>
-              <a:t>Clone: </a:t>
-            </a:r>
-          </a:p>
-          <a:p>
-            <a:r>
-              <a:rPr lang="en-US" sz="1600" b="1" dirty="0">
-                <a:latin typeface="Courier New"/>
-                <a:cs typeface="Courier New"/>
-                <a:hlinkClick r:id="rId2"/>
-              </a:rPr>
-              <a:t>https://github.com/arapehl/drdobbsindia-jquery-</a:t>
-            </a:r>
-            <a:r>
-              <a:rPr lang="en-US" sz="1600" b="1" dirty="0" smtClean="0">
-                <a:latin typeface="Courier New"/>
-                <a:cs typeface="Courier New"/>
-                <a:hlinkClick r:id="rId2"/>
-              </a:rPr>
-              <a:t>workshop</a:t>
-            </a:r>
-            <a:endParaRPr lang="en-US" sz="1600" b="1" dirty="0" smtClean="0">
-              <a:latin typeface="Courier New"/>
-              <a:cs typeface="Courier New"/>
-            </a:endParaRPr>
-          </a:p>
-          <a:p>
-            <a:endParaRPr lang="en-US" dirty="0" smtClean="0"/>
-          </a:p>
-          <a:p>
-            <a:r>
-              <a:rPr lang="en-US" dirty="0" smtClean="0"/>
               <a:t>Download:</a:t>
             </a:r>
           </a:p>
           <a:p>
             <a:r>
-              <a:rPr lang="en-US" sz="1600" b="1" dirty="0" smtClean="0">
-                <a:latin typeface="Courier New"/>
-                <a:cs typeface="Courier New"/>
-                <a:hlinkClick r:id="rId3"/>
-              </a:rPr>
-              <a:t>https://github.com/arapehl/drdobbsindia-jquery-workshop/archive/master.zip</a:t>
-            </a:r>
-            <a:endParaRPr lang="en-US" sz="1600" b="1" dirty="0" smtClean="0">
-              <a:latin typeface="Courier New"/>
-              <a:cs typeface="Courier New"/>
-            </a:endParaRPr>
+              <a:rPr lang="en-US" sz="2000" b="1" dirty="0">
+                <a:latin typeface="Courier New"/>
+                <a:cs typeface="Courier New"/>
+              </a:rPr>
+              <a:t>http://</a:t>
+            </a:r>
+            <a:r>
+              <a:rPr lang="en-US" sz="2000" b="1" dirty="0" err="1">
+                <a:latin typeface="Courier New"/>
+                <a:cs typeface="Courier New"/>
+              </a:rPr>
+              <a:t>bit.ly</a:t>
+            </a:r>
+            <a:r>
+              <a:rPr lang="en-US" sz="2000" b="1" dirty="0">
+                <a:latin typeface="Courier New"/>
+                <a:cs typeface="Courier New"/>
+              </a:rPr>
+              <a:t>/</a:t>
+            </a:r>
+            <a:r>
+              <a:rPr lang="en-US" sz="2000" b="1" dirty="0" err="1">
+                <a:latin typeface="Courier New"/>
+                <a:cs typeface="Courier New"/>
+              </a:rPr>
+              <a:t>drdobbs</a:t>
+            </a:r>
+            <a:r>
+              <a:rPr lang="en-US" sz="2000" b="1" dirty="0">
+                <a:latin typeface="Courier New"/>
+                <a:cs typeface="Courier New"/>
+              </a:rPr>
+              <a:t>-</a:t>
+            </a:r>
+            <a:r>
+              <a:rPr lang="en-US" sz="2000" b="1" dirty="0" err="1">
+                <a:latin typeface="Courier New"/>
+                <a:cs typeface="Courier New"/>
+              </a:rPr>
+              <a:t>jq</a:t>
+            </a:r>
+            <a:r>
+              <a:rPr lang="en-US" sz="2000" b="1" dirty="0">
+                <a:latin typeface="Courier New"/>
+                <a:cs typeface="Courier New"/>
+              </a:rPr>
+              <a:t>-</a:t>
+            </a:r>
+            <a:r>
+              <a:rPr lang="en-US" sz="2000" b="1" dirty="0" smtClean="0">
+                <a:latin typeface="Courier New"/>
+                <a:cs typeface="Courier New"/>
+              </a:rPr>
+              <a:t>zip</a:t>
+            </a:r>
           </a:p>
         </p:txBody>
       </p:sp>
@@ -14234,7 +14286,7 @@
                 <a:latin typeface="Courier New"/>
                 <a:cs typeface="Courier New"/>
               </a:rPr>
-              <a:t>&lt;div id="appointment1"&gt;April 11, 2014&lt;/div&gt;</a:t>
+              <a:t>&lt;div id="appointment2"&gt;April 11, 2014&lt;/div&gt;</a:t>
             </a:r>
           </a:p>
           <a:p>
@@ -15971,7 +16023,7 @@
                 <a:latin typeface="Courier New"/>
                 <a:cs typeface="Courier New"/>
               </a:rPr>
-              <a:t>$('document').on('click', 'a', function (e) {</a:t>
+              <a:t>$(document).on('click', 'a', function (e) {</a:t>
             </a:r>
             <a:br>
               <a:rPr lang="en-US" sz="2000" b="1" dirty="0" smtClean="0">
@@ -16570,7 +16622,21 @@
                 <a:latin typeface="Courier New"/>
                 <a:cs typeface="Courier New"/>
               </a:rPr>
-              <a:t>$('a').on('breathe', function (e) {</a:t>
+              <a:t>$('.state').on('</a:t>
+            </a:r>
+            <a:r>
+              <a:rPr lang="en-US" sz="2000" b="1" dirty="0" err="1" smtClean="0">
+                <a:latin typeface="Courier New"/>
+                <a:cs typeface="Courier New"/>
+              </a:rPr>
+              <a:t>dataReady</a:t>
+            </a:r>
+            <a:r>
+              <a:rPr lang="en-US" sz="2000" b="1" dirty="0" smtClean="0">
+                <a:latin typeface="Courier New"/>
+                <a:cs typeface="Courier New"/>
+              </a:rPr>
+              <a:t>', function (e, payload) {</a:t>
             </a:r>
             <a:br>
               <a:rPr lang="en-US" sz="2000" b="1" dirty="0" smtClean="0">
@@ -16583,48 +16649,35 @@
                 <a:latin typeface="Courier New"/>
                 <a:cs typeface="Courier New"/>
               </a:rPr>
-              <a:t>  </a:t>
+              <a:t>  $(this).</a:t>
             </a:r>
             <a:r>
               <a:rPr lang="en-US" sz="2000" b="1" dirty="0" err="1" smtClean="0">
                 <a:latin typeface="Courier New"/>
                 <a:cs typeface="Courier New"/>
               </a:rPr>
-              <a:t>e.preventDefault</a:t>
-            </a:r>
-            <a:r>
-              <a:rPr lang="en-US" sz="2000" b="1" dirty="0" smtClean="0">
-                <a:latin typeface="Courier New"/>
-                <a:cs typeface="Courier New"/>
-              </a:rPr>
-              <a:t>();</a:t>
-            </a:r>
-            <a:br>
-              <a:rPr lang="en-US" sz="2000" b="1" dirty="0" smtClean="0">
-                <a:latin typeface="Courier New"/>
-                <a:cs typeface="Courier New"/>
-              </a:rPr>
-            </a:br>
-            <a:r>
-              <a:rPr lang="en-US" sz="2000" b="1" dirty="0" smtClean="0">
-                <a:latin typeface="Courier New"/>
-                <a:cs typeface="Courier New"/>
-              </a:rPr>
-              <a:t>  </a:t>
+              <a:t>addClass</a:t>
+            </a:r>
+            <a:r>
+              <a:rPr lang="en-US" sz="2000" b="1" dirty="0" smtClean="0">
+                <a:latin typeface="Courier New"/>
+                <a:cs typeface="Courier New"/>
+              </a:rPr>
+              <a:t>(</a:t>
             </a:r>
             <a:r>
               <a:rPr lang="en-US" sz="2000" b="1" dirty="0" err="1" smtClean="0">
                 <a:latin typeface="Courier New"/>
                 <a:cs typeface="Courier New"/>
               </a:rPr>
-              <a:t>console.log</a:t>
-            </a:r>
-            <a:r>
-              <a:rPr lang="en-US" sz="2000" b="1" dirty="0" smtClean="0">
-                <a:latin typeface="Courier New"/>
-                <a:cs typeface="Courier New"/>
-              </a:rPr>
-              <a:t>('sigh.');</a:t>
+              <a:t>payload.state</a:t>
+            </a:r>
+            <a:r>
+              <a:rPr lang="en-US" sz="2000" b="1" dirty="0" smtClean="0">
+                <a:latin typeface="Courier New"/>
+                <a:cs typeface="Courier New"/>
+              </a:rPr>
+              <a:t>);</a:t>
             </a:r>
             <a:br>
               <a:rPr lang="en-US" sz="2000" b="1" dirty="0" smtClean="0">
@@ -16652,7 +16705,47 @@
                 <a:latin typeface="Courier New"/>
                 <a:cs typeface="Courier New"/>
               </a:rPr>
-              <a:t>$('a').trigger('breathe');</a:t>
+              <a:t>$('.state').trigger('</a:t>
+            </a:r>
+            <a:r>
+              <a:rPr lang="en-US" sz="2000" b="1" dirty="0" err="1" smtClean="0">
+                <a:latin typeface="Courier New"/>
+                <a:cs typeface="Courier New"/>
+              </a:rPr>
+              <a:t>dataReady</a:t>
+            </a:r>
+            <a:r>
+              <a:rPr lang="en-US" sz="2000" b="1" dirty="0" smtClean="0">
+                <a:latin typeface="Courier New"/>
+                <a:cs typeface="Courier New"/>
+              </a:rPr>
+              <a:t>', {</a:t>
+            </a:r>
+            <a:br>
+              <a:rPr lang="en-US" sz="2000" b="1" dirty="0" smtClean="0">
+                <a:latin typeface="Courier New"/>
+                <a:cs typeface="Courier New"/>
+              </a:rPr>
+            </a:br>
+            <a:r>
+              <a:rPr lang="en-US" sz="2000" b="1" dirty="0" smtClean="0">
+                <a:latin typeface="Courier New"/>
+                <a:cs typeface="Courier New"/>
+              </a:rPr>
+              <a:t>  state: 'pending'</a:t>
+            </a:r>
+            <a:br>
+              <a:rPr lang="en-US" sz="2000" b="1" dirty="0" smtClean="0">
+                <a:latin typeface="Courier New"/>
+                <a:cs typeface="Courier New"/>
+              </a:rPr>
+            </a:br>
+            <a:r>
+              <a:rPr lang="en-US" sz="2000" b="1" dirty="0" smtClean="0">
+                <a:latin typeface="Courier New"/>
+                <a:cs typeface="Courier New"/>
+              </a:rPr>
+              <a:t>});</a:t>
             </a:r>
             <a:endParaRPr lang="en-US" sz="2000" b="1" dirty="0">
               <a:latin typeface="Courier New"/>
@@ -16664,7 +16757,7 @@
     </p:spTree>
     <p:extLst>
       <p:ext uri="{BB962C8B-B14F-4D97-AF65-F5344CB8AC3E}">
-        <p14:creationId xmlns:p14="http://schemas.microsoft.com/office/powerpoint/2010/main" val="2907771270"/>
+        <p14:creationId xmlns:p14="http://schemas.microsoft.com/office/powerpoint/2010/main" val="1180200921"/>
       </p:ext>
     </p:extLst>
   </p:cSld>
@@ -16879,334 +16972,6 @@
             <p:ph type="body" idx="1"/>
           </p:nvPr>
         </p:nvSpPr>
-        <p:spPr/>
-        <p:txBody>
-          <a:bodyPr/>
-          <a:lstStyle/>
-          <a:p>
-            <a:r>
-              <a:rPr lang="en-US" dirty="0" smtClean="0"/>
-              <a:t>Custom event</a:t>
-            </a:r>
-          </a:p>
-          <a:p>
-            <a:endParaRPr lang="en-US" dirty="0" smtClean="0"/>
-          </a:p>
-          <a:p>
-            <a:r>
-              <a:rPr lang="en-US" sz="2000" b="1" dirty="0" smtClean="0">
-                <a:latin typeface="Courier New"/>
-                <a:cs typeface="Courier New"/>
-              </a:rPr>
-              <a:t>$('a').on('breathe', function (e, arg1, arg2) {</a:t>
-            </a:r>
-            <a:br>
-              <a:rPr lang="en-US" sz="2000" b="1" dirty="0" smtClean="0">
-                <a:latin typeface="Courier New"/>
-                <a:cs typeface="Courier New"/>
-              </a:rPr>
-            </a:br>
-            <a:r>
-              <a:rPr lang="en-US" sz="2000" b="1" dirty="0" smtClean="0">
-                <a:latin typeface="Courier New"/>
-                <a:cs typeface="Courier New"/>
-              </a:rPr>
-              <a:t>  </a:t>
-            </a:r>
-            <a:r>
-              <a:rPr lang="en-US" sz="2000" b="1" dirty="0" err="1" smtClean="0">
-                <a:latin typeface="Courier New"/>
-                <a:cs typeface="Courier New"/>
-              </a:rPr>
-              <a:t>e.preventDefault</a:t>
-            </a:r>
-            <a:r>
-              <a:rPr lang="en-US" sz="2000" b="1" dirty="0" smtClean="0">
-                <a:latin typeface="Courier New"/>
-                <a:cs typeface="Courier New"/>
-              </a:rPr>
-              <a:t>();</a:t>
-            </a:r>
-            <a:br>
-              <a:rPr lang="en-US" sz="2000" b="1" dirty="0" smtClean="0">
-                <a:latin typeface="Courier New"/>
-                <a:cs typeface="Courier New"/>
-              </a:rPr>
-            </a:br>
-            <a:r>
-              <a:rPr lang="en-US" sz="2000" b="1" dirty="0" smtClean="0">
-                <a:latin typeface="Courier New"/>
-                <a:cs typeface="Courier New"/>
-              </a:rPr>
-              <a:t>  </a:t>
-            </a:r>
-            <a:r>
-              <a:rPr lang="en-US" sz="2000" b="1" dirty="0" err="1" smtClean="0">
-                <a:latin typeface="Courier New"/>
-                <a:cs typeface="Courier New"/>
-              </a:rPr>
-              <a:t>console.log</a:t>
-            </a:r>
-            <a:r>
-              <a:rPr lang="en-US" sz="2000" b="1" dirty="0" smtClean="0">
-                <a:latin typeface="Courier New"/>
-                <a:cs typeface="Courier New"/>
-              </a:rPr>
-              <a:t>('sigh.', arg1, arg2);</a:t>
-            </a:r>
-            <a:br>
-              <a:rPr lang="en-US" sz="2000" b="1" dirty="0" smtClean="0">
-                <a:latin typeface="Courier New"/>
-                <a:cs typeface="Courier New"/>
-              </a:rPr>
-            </a:br>
-            <a:r>
-              <a:rPr lang="en-US" sz="2000" b="1" dirty="0" smtClean="0">
-                <a:latin typeface="Courier New"/>
-                <a:cs typeface="Courier New"/>
-              </a:rPr>
-              <a:t>});</a:t>
-            </a:r>
-          </a:p>
-          <a:p>
-            <a:endParaRPr lang="en-US" sz="2000" b="1" dirty="0">
-              <a:latin typeface="Courier New"/>
-              <a:cs typeface="Courier New"/>
-            </a:endParaRPr>
-          </a:p>
-          <a:p>
-            <a:r>
-              <a:rPr lang="en-US" sz="2000" b="1" dirty="0" smtClean="0">
-                <a:latin typeface="Courier New"/>
-                <a:cs typeface="Courier New"/>
-              </a:rPr>
-              <a:t>$('a').trigger('breathe', ['hello', 'world']);</a:t>
-            </a:r>
-            <a:endParaRPr lang="en-US" sz="2000" b="1" dirty="0">
-              <a:latin typeface="Courier New"/>
-              <a:cs typeface="Courier New"/>
-            </a:endParaRPr>
-          </a:p>
-        </p:txBody>
-      </p:sp>
-    </p:spTree>
-    <p:extLst>
-      <p:ext uri="{BB962C8B-B14F-4D97-AF65-F5344CB8AC3E}">
-        <p14:creationId xmlns:p14="http://schemas.microsoft.com/office/powerpoint/2010/main" val="1180200921"/>
-      </p:ext>
-    </p:extLst>
-  </p:cSld>
-  <p:clrMapOvr>
-    <a:masterClrMapping/>
-  </p:clrMapOvr>
-  <p:timing>
-    <p:tnLst>
-      <p:par>
-        <p:cTn xmlns:p14="http://schemas.microsoft.com/office/powerpoint/2010/main" id="1" dur="indefinite" restart="never" nodeType="tmRoot">
-          <p:childTnLst>
-            <p:seq concurrent="1" nextAc="seek">
-              <p:cTn id="2" dur="indefinite" nodeType="mainSeq">
-                <p:childTnLst>
-                  <p:par>
-                    <p:cTn id="3" fill="hold">
-                      <p:stCondLst>
-                        <p:cond delay="indefinite"/>
-                      </p:stCondLst>
-                      <p:childTnLst>
-                        <p:par>
-                          <p:cTn id="4" fill="hold">
-                            <p:stCondLst>
-                              <p:cond delay="0"/>
-                            </p:stCondLst>
-                            <p:childTnLst>
-                              <p:par>
-                                <p:cTn id="5" presetID="10" presetClass="entr" presetSubtype="0" fill="hold" grpId="0" nodeType="clickEffect">
-                                  <p:stCondLst>
-                                    <p:cond delay="0"/>
-                                  </p:stCondLst>
-                                  <p:childTnLst>
-                                    <p:set>
-                                      <p:cBhvr>
-                                        <p:cTn id="6" dur="1" fill="hold">
-                                          <p:stCondLst>
-                                            <p:cond delay="0"/>
-                                          </p:stCondLst>
-                                        </p:cTn>
-                                        <p:tgtEl>
-                                          <p:spTgt spid="3">
-                                            <p:txEl>
-                                              <p:pRg st="2" end="2"/>
-                                            </p:txEl>
-                                          </p:spTgt>
-                                        </p:tgtEl>
-                                        <p:attrNameLst>
-                                          <p:attrName>style.visibility</p:attrName>
-                                        </p:attrNameLst>
-                                      </p:cBhvr>
-                                      <p:to>
-                                        <p:strVal val="visible"/>
-                                      </p:to>
-                                    </p:set>
-                                    <p:animEffect transition="in" filter="fade">
-                                      <p:cBhvr>
-                                        <p:cTn id="7" dur="500"/>
-                                        <p:tgtEl>
-                                          <p:spTgt spid="3">
-                                            <p:txEl>
-                                              <p:pRg st="2" end="2"/>
-                                            </p:txEl>
-                                          </p:spTgt>
-                                        </p:tgtEl>
-                                      </p:cBhvr>
-                                    </p:animEffect>
-                                  </p:childTnLst>
-                                </p:cTn>
-                              </p:par>
-                            </p:childTnLst>
-                          </p:cTn>
-                        </p:par>
-                      </p:childTnLst>
-                    </p:cTn>
-                  </p:par>
-                  <p:par>
-                    <p:cTn id="8" fill="hold">
-                      <p:stCondLst>
-                        <p:cond delay="indefinite"/>
-                      </p:stCondLst>
-                      <p:childTnLst>
-                        <p:par>
-                          <p:cTn id="9" fill="hold">
-                            <p:stCondLst>
-                              <p:cond delay="0"/>
-                            </p:stCondLst>
-                            <p:childTnLst>
-                              <p:par>
-                                <p:cTn id="10" presetID="10" presetClass="entr" presetSubtype="0" fill="hold" grpId="0" nodeType="clickEffect">
-                                  <p:stCondLst>
-                                    <p:cond delay="0"/>
-                                  </p:stCondLst>
-                                  <p:childTnLst>
-                                    <p:set>
-                                      <p:cBhvr>
-                                        <p:cTn id="11" dur="1" fill="hold">
-                                          <p:stCondLst>
-                                            <p:cond delay="0"/>
-                                          </p:stCondLst>
-                                        </p:cTn>
-                                        <p:tgtEl>
-                                          <p:spTgt spid="3">
-                                            <p:txEl>
-                                              <p:pRg st="4" end="4"/>
-                                            </p:txEl>
-                                          </p:spTgt>
-                                        </p:tgtEl>
-                                        <p:attrNameLst>
-                                          <p:attrName>style.visibility</p:attrName>
-                                        </p:attrNameLst>
-                                      </p:cBhvr>
-                                      <p:to>
-                                        <p:strVal val="visible"/>
-                                      </p:to>
-                                    </p:set>
-                                    <p:animEffect transition="in" filter="fade">
-                                      <p:cBhvr>
-                                        <p:cTn id="12" dur="500"/>
-                                        <p:tgtEl>
-                                          <p:spTgt spid="3">
-                                            <p:txEl>
-                                              <p:pRg st="4" end="4"/>
-                                            </p:txEl>
-                                          </p:spTgt>
-                                        </p:tgtEl>
-                                      </p:cBhvr>
-                                    </p:animEffect>
-                                  </p:childTnLst>
-                                </p:cTn>
-                              </p:par>
-                            </p:childTnLst>
-                          </p:cTn>
-                        </p:par>
-                      </p:childTnLst>
-                    </p:cTn>
-                  </p:par>
-                </p:childTnLst>
-              </p:cTn>
-              <p:prevCondLst>
-                <p:cond evt="onPrev" delay="0">
-                  <p:tgtEl>
-                    <p:sldTgt/>
-                  </p:tgtEl>
-                </p:cond>
-              </p:prevCondLst>
-              <p:nextCondLst>
-                <p:cond evt="onNext" delay="0">
-                  <p:tgtEl>
-                    <p:sldTgt/>
-                  </p:tgtEl>
-                </p:cond>
-              </p:nextCondLst>
-            </p:seq>
-          </p:childTnLst>
-        </p:cTn>
-      </p:par>
-    </p:tnLst>
-    <p:bldLst>
-      <p:bldP spid="3" grpId="0" build="p"/>
-    </p:bldLst>
-  </p:timing>
-</p:sld>
-</file>
-
-<file path=ppt/slides/slide42.xml><?xml version="1.0" encoding="utf-8"?>
-<p:sld xmlns:a="http://schemas.openxmlformats.org/drawingml/2006/main" xmlns:r="http://schemas.openxmlformats.org/officeDocument/2006/relationships" xmlns:p="http://schemas.openxmlformats.org/presentationml/2006/main">
-  <p:cSld>
-    <p:spTree>
-      <p:nvGrpSpPr>
-        <p:cNvPr id="1" name=""/>
-        <p:cNvGrpSpPr/>
-        <p:nvPr/>
-      </p:nvGrpSpPr>
-      <p:grpSpPr>
-        <a:xfrm>
-          <a:off x="0" y="0"/>
-          <a:ext cx="0" cy="0"/>
-          <a:chOff x="0" y="0"/>
-          <a:chExt cx="0" cy="0"/>
-        </a:xfrm>
-      </p:grpSpPr>
-      <p:sp>
-        <p:nvSpPr>
-          <p:cNvPr id="2" name="Title 1"/>
-          <p:cNvSpPr>
-            <a:spLocks noGrp="1"/>
-          </p:cNvSpPr>
-          <p:nvPr>
-            <p:ph type="title"/>
-          </p:nvPr>
-        </p:nvSpPr>
-        <p:spPr/>
-        <p:txBody>
-          <a:bodyPr/>
-          <a:lstStyle/>
-          <a:p>
-            <a:r>
-              <a:rPr lang="en-US" dirty="0" smtClean="0"/>
-              <a:t>Events</a:t>
-            </a:r>
-            <a:endParaRPr lang="en-US" dirty="0"/>
-          </a:p>
-        </p:txBody>
-      </p:sp>
-      <p:sp>
-        <p:nvSpPr>
-          <p:cNvPr id="3" name="Text Placeholder 2"/>
-          <p:cNvSpPr>
-            <a:spLocks noGrp="1"/>
-          </p:cNvSpPr>
-          <p:nvPr>
-            <p:ph type="body" idx="1"/>
-          </p:nvPr>
-        </p:nvSpPr>
         <p:spPr>
           <a:xfrm>
             <a:off x="457200" y="1191569"/>
@@ -17242,7 +17007,7 @@
                 <a:latin typeface="Courier New"/>
                 <a:cs typeface="Courier New"/>
               </a:rPr>
-              <a:t>click.typeA</a:t>
+              <a:t>click.loggedIn</a:t>
             </a:r>
             <a:r>
               <a:rPr lang="en-US" sz="2000" b="1" dirty="0" smtClean="0">
@@ -17276,64 +17041,57 @@
                 <a:latin typeface="Courier New"/>
                 <a:cs typeface="Courier New"/>
               </a:rPr>
-              <a:t>('</a:t>
+              <a:t>('logged in click')</a:t>
+            </a:r>
+            <a:br>
+              <a:rPr lang="en-US" sz="2000" b="1" dirty="0" smtClean="0">
+                <a:latin typeface="Courier New"/>
+                <a:cs typeface="Courier New"/>
+              </a:rPr>
+            </a:br>
+            <a:r>
+              <a:rPr lang="en-US" sz="2000" b="1" dirty="0" smtClean="0">
+                <a:latin typeface="Courier New"/>
+                <a:cs typeface="Courier New"/>
+              </a:rPr>
+              <a:t>});</a:t>
+            </a:r>
+          </a:p>
+          <a:p>
+            <a:r>
+              <a:rPr lang="en-US" sz="2000" b="1" dirty="0">
+                <a:latin typeface="Courier New"/>
+                <a:cs typeface="Courier New"/>
+              </a:rPr>
+              <a:t>$('a').on(</a:t>
+            </a:r>
+            <a:r>
+              <a:rPr lang="en-US" sz="2000" b="1" dirty="0" smtClean="0">
+                <a:latin typeface="Courier New"/>
+                <a:cs typeface="Courier New"/>
+              </a:rPr>
+              <a:t>'</a:t>
             </a:r>
             <a:r>
               <a:rPr lang="en-US" sz="2000" b="1" dirty="0" err="1" smtClean="0">
                 <a:latin typeface="Courier New"/>
                 <a:cs typeface="Courier New"/>
               </a:rPr>
-              <a:t>typeA</a:t>
-            </a:r>
-            <a:r>
-              <a:rPr lang="en-US" sz="2000" b="1" dirty="0" smtClean="0">
-                <a:latin typeface="Courier New"/>
-                <a:cs typeface="Courier New"/>
-              </a:rPr>
-              <a:t> click')</a:t>
-            </a:r>
-            <a:br>
-              <a:rPr lang="en-US" sz="2000" b="1" dirty="0" smtClean="0">
-                <a:latin typeface="Courier New"/>
-                <a:cs typeface="Courier New"/>
-              </a:rPr>
-            </a:br>
-            <a:r>
-              <a:rPr lang="en-US" sz="2000" b="1" dirty="0" smtClean="0">
-                <a:latin typeface="Courier New"/>
-                <a:cs typeface="Courier New"/>
-              </a:rPr>
-              <a:t>});</a:t>
-            </a:r>
-          </a:p>
-          <a:p>
+              <a:t>mouseover.loggedIn</a:t>
+            </a:r>
+            <a:r>
+              <a:rPr lang="en-US" sz="2000" b="1" dirty="0" smtClean="0">
+                <a:latin typeface="Courier New"/>
+                <a:cs typeface="Courier New"/>
+              </a:rPr>
+              <a:t>'</a:t>
+            </a:r>
             <a:r>
               <a:rPr lang="en-US" sz="2000" b="1" dirty="0">
                 <a:latin typeface="Courier New"/>
                 <a:cs typeface="Courier New"/>
               </a:rPr>
-              <a:t>$('a').on(</a:t>
-            </a:r>
-            <a:r>
-              <a:rPr lang="en-US" sz="2000" b="1" dirty="0" smtClean="0">
-                <a:latin typeface="Courier New"/>
-                <a:cs typeface="Courier New"/>
-              </a:rPr>
-              <a:t>'</a:t>
-            </a:r>
-            <a:r>
-              <a:rPr lang="en-US" sz="2000" b="1" dirty="0" err="1" smtClean="0">
-                <a:latin typeface="Courier New"/>
-                <a:cs typeface="Courier New"/>
-              </a:rPr>
-              <a:t>mouseover.typeA</a:t>
-            </a:r>
-            <a:r>
-              <a:rPr lang="en-US" sz="2000" b="1" dirty="0">
-                <a:latin typeface="Courier New"/>
-                <a:cs typeface="Courier New"/>
-              </a:rPr>
-              <a:t>', function (e) {</a:t>
+              <a:t>, function (e) {</a:t>
             </a:r>
             <a:br>
               <a:rPr lang="en-US" sz="2000" b="1" dirty="0">
@@ -17360,21 +17118,7 @@
                 <a:latin typeface="Courier New"/>
                 <a:cs typeface="Courier New"/>
               </a:rPr>
-              <a:t>('</a:t>
-            </a:r>
-            <a:r>
-              <a:rPr lang="en-US" sz="2000" b="1" dirty="0" err="1" smtClean="0">
-                <a:latin typeface="Courier New"/>
-                <a:cs typeface="Courier New"/>
-              </a:rPr>
-              <a:t>typeA</a:t>
-            </a:r>
-            <a:r>
-              <a:rPr lang="en-US" sz="2000" b="1" dirty="0" smtClean="0">
-                <a:latin typeface="Courier New"/>
-                <a:cs typeface="Courier New"/>
-              </a:rPr>
-              <a:t> </a:t>
+              <a:t>('logged in </a:t>
             </a:r>
             <a:r>
               <a:rPr lang="en-US" sz="2000" b="1" dirty="0" err="1" smtClean="0">
@@ -17424,7 +17168,7 @@
                 <a:latin typeface="Courier New"/>
                 <a:cs typeface="Courier New"/>
               </a:rPr>
-              <a:t>typeA</a:t>
+              <a:t>loggedIn</a:t>
             </a:r>
             <a:r>
               <a:rPr lang="en-US" sz="2000" b="1" dirty="0" smtClean="0">
@@ -17665,7 +17409,7 @@
 </p:sld>
 </file>
 
-<file path=ppt/slides/slide43.xml><?xml version="1.0" encoding="utf-8"?>
+<file path=ppt/slides/slide42.xml><?xml version="1.0" encoding="utf-8"?>
 <p:sld xmlns:a="http://schemas.openxmlformats.org/drawingml/2006/main" xmlns:r="http://schemas.openxmlformats.org/officeDocument/2006/relationships" xmlns:p="http://schemas.openxmlformats.org/presentationml/2006/main">
   <p:cSld>
     <p:spTree>
@@ -18071,7 +17815,7 @@
 </p:sld>
 </file>
 
-<file path=ppt/slides/slide44.xml><?xml version="1.0" encoding="utf-8"?>
+<file path=ppt/slides/slide43.xml><?xml version="1.0" encoding="utf-8"?>
 <p:sld xmlns:a="http://schemas.openxmlformats.org/drawingml/2006/main" xmlns:r="http://schemas.openxmlformats.org/officeDocument/2006/relationships" xmlns:p="http://schemas.openxmlformats.org/presentationml/2006/main">
   <p:cSld>
     <p:spTree>
@@ -18566,7 +18310,7 @@
 </p:sld>
 </file>
 
-<file path=ppt/slides/slide45.xml><?xml version="1.0" encoding="utf-8"?>
+<file path=ppt/slides/slide44.xml><?xml version="1.0" encoding="utf-8"?>
 <p:sld xmlns:a="http://schemas.openxmlformats.org/drawingml/2006/main" xmlns:r="http://schemas.openxmlformats.org/officeDocument/2006/relationships" xmlns:p="http://schemas.openxmlformats.org/presentationml/2006/main">
   <p:cSld>
     <p:spTree>
@@ -18923,7 +18667,7 @@
 </p:sld>
 </file>
 
-<file path=ppt/slides/slide46.xml><?xml version="1.0" encoding="utf-8"?>
+<file path=ppt/slides/slide45.xml><?xml version="1.0" encoding="utf-8"?>
 <p:sld xmlns:a="http://schemas.openxmlformats.org/drawingml/2006/main" xmlns:r="http://schemas.openxmlformats.org/officeDocument/2006/relationships" xmlns:p="http://schemas.openxmlformats.org/presentationml/2006/main">
   <p:cSld>
     <p:spTree>
@@ -19002,7 +18746,7 @@
 </p:sld>
 </file>
 
-<file path=ppt/slides/slide47.xml><?xml version="1.0" encoding="utf-8"?>
+<file path=ppt/slides/slide46.xml><?xml version="1.0" encoding="utf-8"?>
 <p:sld xmlns:a="http://schemas.openxmlformats.org/drawingml/2006/main" xmlns:r="http://schemas.openxmlformats.org/officeDocument/2006/relationships" xmlns:p="http://schemas.openxmlformats.org/presentationml/2006/main">
   <p:cSld>
     <p:spTree>
@@ -19384,7 +19128,7 @@
 </p:sld>
 </file>
 
-<file path=ppt/slides/slide48.xml><?xml version="1.0" encoding="utf-8"?>
+<file path=ppt/slides/slide47.xml><?xml version="1.0" encoding="utf-8"?>
 <p:sld xmlns:a="http://schemas.openxmlformats.org/drawingml/2006/main" xmlns:r="http://schemas.openxmlformats.org/officeDocument/2006/relationships" xmlns:p="http://schemas.openxmlformats.org/presentationml/2006/main">
   <p:cSld>
     <p:spTree>
@@ -19507,7 +19251,7 @@
                 <a:latin typeface="Courier New"/>
                 <a:cs typeface="Courier New"/>
               </a:rPr>
-              <a:t>}</a:t>
+              <a:t>};</a:t>
             </a:r>
             <a:endParaRPr lang="en-US" sz="2000" b="1" dirty="0">
               <a:latin typeface="Courier New"/>
@@ -19996,7 +19740,7 @@
 </p:sld>
 </file>
 
-<file path=ppt/slides/slide49.xml><?xml version="1.0" encoding="utf-8"?>
+<file path=ppt/slides/slide48.xml><?xml version="1.0" encoding="utf-8"?>
 <p:sld xmlns:a="http://schemas.openxmlformats.org/drawingml/2006/main" xmlns:r="http://schemas.openxmlformats.org/officeDocument/2006/relationships" xmlns:p="http://schemas.openxmlformats.org/presentationml/2006/main">
   <p:cSld>
     <p:spTree>
@@ -20075,86 +19819,7 @@
 </p:sld>
 </file>
 
-<file path=ppt/slides/slide5.xml><?xml version="1.0" encoding="utf-8"?>
-<p:sld xmlns:a="http://schemas.openxmlformats.org/drawingml/2006/main" xmlns:r="http://schemas.openxmlformats.org/officeDocument/2006/relationships" xmlns:p="http://schemas.openxmlformats.org/presentationml/2006/main">
-  <p:cSld>
-    <p:spTree>
-      <p:nvGrpSpPr>
-        <p:cNvPr id="1" name=""/>
-        <p:cNvGrpSpPr/>
-        <p:nvPr/>
-      </p:nvGrpSpPr>
-      <p:grpSpPr>
-        <a:xfrm>
-          <a:off x="0" y="0"/>
-          <a:ext cx="0" cy="0"/>
-          <a:chOff x="0" y="0"/>
-          <a:chExt cx="0" cy="0"/>
-        </a:xfrm>
-      </p:grpSpPr>
-      <p:sp>
-        <p:nvSpPr>
-          <p:cNvPr id="2" name="Subtitle 1"/>
-          <p:cNvSpPr>
-            <a:spLocks noGrp="1"/>
-          </p:cNvSpPr>
-          <p:nvPr>
-            <p:ph type="subTitle" idx="1"/>
-          </p:nvPr>
-        </p:nvSpPr>
-        <p:spPr/>
-        <p:txBody>
-          <a:bodyPr/>
-          <a:lstStyle/>
-          <a:p>
-            <a:endParaRPr lang="en-US"/>
-          </a:p>
-        </p:txBody>
-      </p:sp>
-      <p:sp>
-        <p:nvSpPr>
-          <p:cNvPr id="3" name="Title 2"/>
-          <p:cNvSpPr>
-            <a:spLocks noGrp="1"/>
-          </p:cNvSpPr>
-          <p:nvPr>
-            <p:ph type="ctrTitle"/>
-          </p:nvPr>
-        </p:nvSpPr>
-        <p:spPr/>
-        <p:txBody>
-          <a:bodyPr/>
-          <a:lstStyle/>
-          <a:p>
-            <a:r>
-              <a:rPr lang="en-US" dirty="0" smtClean="0"/>
-              <a:t>DOM Traversal</a:t>
-            </a:r>
-            <a:endParaRPr lang="en-US" dirty="0"/>
-          </a:p>
-        </p:txBody>
-      </p:sp>
-    </p:spTree>
-    <p:extLst>
-      <p:ext uri="{BB962C8B-B14F-4D97-AF65-F5344CB8AC3E}">
-        <p14:creationId xmlns:p14="http://schemas.microsoft.com/office/powerpoint/2010/main" val="775419396"/>
-      </p:ext>
-    </p:extLst>
-  </p:cSld>
-  <p:clrMapOvr>
-    <a:masterClrMapping/>
-  </p:clrMapOvr>
-  <p:timing>
-    <p:tnLst>
-      <p:par>
-        <p:cTn xmlns:p14="http://schemas.microsoft.com/office/powerpoint/2010/main" id="1" dur="indefinite" restart="never" nodeType="tmRoot"/>
-      </p:par>
-    </p:tnLst>
-  </p:timing>
-</p:sld>
-</file>
-
-<file path=ppt/slides/slide50.xml><?xml version="1.0" encoding="utf-8"?>
+<file path=ppt/slides/slide49.xml><?xml version="1.0" encoding="utf-8"?>
 <p:sld xmlns:a="http://schemas.openxmlformats.org/drawingml/2006/main" xmlns:r="http://schemas.openxmlformats.org/officeDocument/2006/relationships" xmlns:p="http://schemas.openxmlformats.org/presentationml/2006/main">
   <p:cSld>
     <p:spTree>
@@ -20737,7 +20402,86 @@
 </p:sld>
 </file>
 
-<file path=ppt/slides/slide51.xml><?xml version="1.0" encoding="utf-8"?>
+<file path=ppt/slides/slide5.xml><?xml version="1.0" encoding="utf-8"?>
+<p:sld xmlns:a="http://schemas.openxmlformats.org/drawingml/2006/main" xmlns:r="http://schemas.openxmlformats.org/officeDocument/2006/relationships" xmlns:p="http://schemas.openxmlformats.org/presentationml/2006/main">
+  <p:cSld>
+    <p:spTree>
+      <p:nvGrpSpPr>
+        <p:cNvPr id="1" name=""/>
+        <p:cNvGrpSpPr/>
+        <p:nvPr/>
+      </p:nvGrpSpPr>
+      <p:grpSpPr>
+        <a:xfrm>
+          <a:off x="0" y="0"/>
+          <a:ext cx="0" cy="0"/>
+          <a:chOff x="0" y="0"/>
+          <a:chExt cx="0" cy="0"/>
+        </a:xfrm>
+      </p:grpSpPr>
+      <p:sp>
+        <p:nvSpPr>
+          <p:cNvPr id="2" name="Subtitle 1"/>
+          <p:cNvSpPr>
+            <a:spLocks noGrp="1"/>
+          </p:cNvSpPr>
+          <p:nvPr>
+            <p:ph type="subTitle" idx="1"/>
+          </p:nvPr>
+        </p:nvSpPr>
+        <p:spPr/>
+        <p:txBody>
+          <a:bodyPr/>
+          <a:lstStyle/>
+          <a:p>
+            <a:endParaRPr lang="en-US"/>
+          </a:p>
+        </p:txBody>
+      </p:sp>
+      <p:sp>
+        <p:nvSpPr>
+          <p:cNvPr id="3" name="Title 2"/>
+          <p:cNvSpPr>
+            <a:spLocks noGrp="1"/>
+          </p:cNvSpPr>
+          <p:nvPr>
+            <p:ph type="ctrTitle"/>
+          </p:nvPr>
+        </p:nvSpPr>
+        <p:spPr/>
+        <p:txBody>
+          <a:bodyPr/>
+          <a:lstStyle/>
+          <a:p>
+            <a:r>
+              <a:rPr lang="en-US" dirty="0" smtClean="0"/>
+              <a:t>DOM Traversal</a:t>
+            </a:r>
+            <a:endParaRPr lang="en-US" dirty="0"/>
+          </a:p>
+        </p:txBody>
+      </p:sp>
+    </p:spTree>
+    <p:extLst>
+      <p:ext uri="{BB962C8B-B14F-4D97-AF65-F5344CB8AC3E}">
+        <p14:creationId xmlns:p14="http://schemas.microsoft.com/office/powerpoint/2010/main" val="775419396"/>
+      </p:ext>
+    </p:extLst>
+  </p:cSld>
+  <p:clrMapOvr>
+    <a:masterClrMapping/>
+  </p:clrMapOvr>
+  <p:timing>
+    <p:tnLst>
+      <p:par>
+        <p:cTn xmlns:p14="http://schemas.microsoft.com/office/powerpoint/2010/main" id="1" dur="indefinite" restart="never" nodeType="tmRoot"/>
+      </p:par>
+    </p:tnLst>
+  </p:timing>
+</p:sld>
+</file>
+
+<file path=ppt/slides/slide50.xml><?xml version="1.0" encoding="utf-8"?>
 <p:sld xmlns:a="http://schemas.openxmlformats.org/drawingml/2006/main" xmlns:r="http://schemas.openxmlformats.org/officeDocument/2006/relationships" xmlns:p="http://schemas.openxmlformats.org/presentationml/2006/main">
   <p:cSld>
     <p:spTree>
@@ -22745,7 +22489,7 @@
                 <a:latin typeface="Courier New"/>
                 <a:cs typeface="Courier New"/>
               </a:rPr>
-              <a:t>undefined</a:t>
+              <a:t>undefined;</a:t>
             </a:r>
             <a:br>
               <a:rPr lang="en-US" sz="2000" b="1" dirty="0" smtClean="0">
@@ -22886,6 +22630,7 @@
                 <a:solidFill>
                   <a:schemeClr val="tx1"/>
                 </a:solidFill>
+                <a:hlinkClick r:id="rId2"/>
               </a:rPr>
               <a:t>Try it!</a:t>
             </a:r>

</xml_diff>